<commit_message>
update and 2 page
</commit_message>
<xml_diff>
--- a/Proposal/One Page/illustration.pptx
+++ b/Proposal/One Page/illustration.pptx
@@ -9,6 +9,7 @@
     <p:sldId id="257" r:id="rId3"/>
     <p:sldId id="258" r:id="rId4"/>
     <p:sldId id="259" r:id="rId5"/>
+    <p:sldId id="260" r:id="rId6"/>
   </p:sldIdLst>
   <p:sldSz cx="12192000" cy="6858000"/>
   <p:notesSz cx="6858000" cy="9144000"/>
@@ -262,7 +263,7 @@
           <a:p>
             <a:fld id="{7F066E50-901D-44D0-A408-47404A15693D}" type="datetimeFigureOut">
               <a:rPr lang="zh-CN" altLang="en-US" smtClean="0"/>
-              <a:t>2022/12/6</a:t>
+              <a:t>2022/12/9</a:t>
             </a:fld>
             <a:endParaRPr lang="zh-CN" altLang="en-US"/>
           </a:p>
@@ -460,7 +461,7 @@
           <a:p>
             <a:fld id="{7F066E50-901D-44D0-A408-47404A15693D}" type="datetimeFigureOut">
               <a:rPr lang="zh-CN" altLang="en-US" smtClean="0"/>
-              <a:t>2022/12/6</a:t>
+              <a:t>2022/12/9</a:t>
             </a:fld>
             <a:endParaRPr lang="zh-CN" altLang="en-US"/>
           </a:p>
@@ -668,7 +669,7 @@
           <a:p>
             <a:fld id="{7F066E50-901D-44D0-A408-47404A15693D}" type="datetimeFigureOut">
               <a:rPr lang="zh-CN" altLang="en-US" smtClean="0"/>
-              <a:t>2022/12/6</a:t>
+              <a:t>2022/12/9</a:t>
             </a:fld>
             <a:endParaRPr lang="zh-CN" altLang="en-US"/>
           </a:p>
@@ -866,7 +867,7 @@
           <a:p>
             <a:fld id="{7F066E50-901D-44D0-A408-47404A15693D}" type="datetimeFigureOut">
               <a:rPr lang="zh-CN" altLang="en-US" smtClean="0"/>
-              <a:t>2022/12/6</a:t>
+              <a:t>2022/12/9</a:t>
             </a:fld>
             <a:endParaRPr lang="zh-CN" altLang="en-US"/>
           </a:p>
@@ -1141,7 +1142,7 @@
           <a:p>
             <a:fld id="{7F066E50-901D-44D0-A408-47404A15693D}" type="datetimeFigureOut">
               <a:rPr lang="zh-CN" altLang="en-US" smtClean="0"/>
-              <a:t>2022/12/6</a:t>
+              <a:t>2022/12/9</a:t>
             </a:fld>
             <a:endParaRPr lang="zh-CN" altLang="en-US"/>
           </a:p>
@@ -1406,7 +1407,7 @@
           <a:p>
             <a:fld id="{7F066E50-901D-44D0-A408-47404A15693D}" type="datetimeFigureOut">
               <a:rPr lang="zh-CN" altLang="en-US" smtClean="0"/>
-              <a:t>2022/12/6</a:t>
+              <a:t>2022/12/9</a:t>
             </a:fld>
             <a:endParaRPr lang="zh-CN" altLang="en-US"/>
           </a:p>
@@ -1818,7 +1819,7 @@
           <a:p>
             <a:fld id="{7F066E50-901D-44D0-A408-47404A15693D}" type="datetimeFigureOut">
               <a:rPr lang="zh-CN" altLang="en-US" smtClean="0"/>
-              <a:t>2022/12/6</a:t>
+              <a:t>2022/12/9</a:t>
             </a:fld>
             <a:endParaRPr lang="zh-CN" altLang="en-US"/>
           </a:p>
@@ -1959,7 +1960,7 @@
           <a:p>
             <a:fld id="{7F066E50-901D-44D0-A408-47404A15693D}" type="datetimeFigureOut">
               <a:rPr lang="zh-CN" altLang="en-US" smtClean="0"/>
-              <a:t>2022/12/6</a:t>
+              <a:t>2022/12/9</a:t>
             </a:fld>
             <a:endParaRPr lang="zh-CN" altLang="en-US"/>
           </a:p>
@@ -2072,7 +2073,7 @@
           <a:p>
             <a:fld id="{7F066E50-901D-44D0-A408-47404A15693D}" type="datetimeFigureOut">
               <a:rPr lang="zh-CN" altLang="en-US" smtClean="0"/>
-              <a:t>2022/12/6</a:t>
+              <a:t>2022/12/9</a:t>
             </a:fld>
             <a:endParaRPr lang="zh-CN" altLang="en-US"/>
           </a:p>
@@ -2383,7 +2384,7 @@
           <a:p>
             <a:fld id="{7F066E50-901D-44D0-A408-47404A15693D}" type="datetimeFigureOut">
               <a:rPr lang="zh-CN" altLang="en-US" smtClean="0"/>
-              <a:t>2022/12/6</a:t>
+              <a:t>2022/12/9</a:t>
             </a:fld>
             <a:endParaRPr lang="zh-CN" altLang="en-US"/>
           </a:p>
@@ -2671,7 +2672,7 @@
           <a:p>
             <a:fld id="{7F066E50-901D-44D0-A408-47404A15693D}" type="datetimeFigureOut">
               <a:rPr lang="zh-CN" altLang="en-US" smtClean="0"/>
-              <a:t>2022/12/6</a:t>
+              <a:t>2022/12/9</a:t>
             </a:fld>
             <a:endParaRPr lang="zh-CN" altLang="en-US"/>
           </a:p>
@@ -2912,7 +2913,7 @@
           <a:p>
             <a:fld id="{7F066E50-901D-44D0-A408-47404A15693D}" type="datetimeFigureOut">
               <a:rPr lang="zh-CN" altLang="en-US" smtClean="0"/>
-              <a:t>2022/12/6</a:t>
+              <a:t>2022/12/9</a:t>
             </a:fld>
             <a:endParaRPr lang="zh-CN" altLang="en-US"/>
           </a:p>
@@ -9436,6 +9437,1784 @@
 </p:sld>
 </file>
 
+<file path=ppt/slides/slide5.xml><?xml version="1.0" encoding="utf-8"?>
+<p:sld xmlns:a="http://schemas.openxmlformats.org/drawingml/2006/main" xmlns:r="http://schemas.openxmlformats.org/officeDocument/2006/relationships" xmlns:p="http://schemas.openxmlformats.org/presentationml/2006/main">
+  <p:cSld>
+    <p:spTree>
+      <p:nvGrpSpPr>
+        <p:cNvPr id="1" name=""/>
+        <p:cNvGrpSpPr/>
+        <p:nvPr/>
+      </p:nvGrpSpPr>
+      <p:grpSpPr>
+        <a:xfrm>
+          <a:off x="0" y="0"/>
+          <a:ext cx="0" cy="0"/>
+          <a:chOff x="0" y="0"/>
+          <a:chExt cx="0" cy="0"/>
+        </a:xfrm>
+      </p:grpSpPr>
+      <p:sp>
+        <p:nvSpPr>
+          <p:cNvPr id="47" name="矩形: 圆角 46">
+            <a:extLst>
+              <a:ext uri="{FF2B5EF4-FFF2-40B4-BE49-F238E27FC236}">
+                <a16:creationId xmlns:a16="http://schemas.microsoft.com/office/drawing/2014/main" id="{FB57C05E-97F1-907B-EB80-98B80E9EAB07}"/>
+              </a:ext>
+            </a:extLst>
+          </p:cNvPr>
+          <p:cNvSpPr/>
+          <p:nvPr/>
+        </p:nvSpPr>
+        <p:spPr>
+          <a:xfrm>
+            <a:off x="2432197" y="404925"/>
+            <a:ext cx="6896100" cy="5932372"/>
+          </a:xfrm>
+          <a:prstGeom prst="roundRect">
+            <a:avLst/>
+          </a:prstGeom>
+          <a:solidFill>
+            <a:schemeClr val="accent3">
+              <a:lumMod val="20000"/>
+              <a:lumOff val="80000"/>
+            </a:schemeClr>
+          </a:solidFill>
+          <a:ln>
+            <a:noFill/>
+          </a:ln>
+        </p:spPr>
+        <p:style>
+          <a:lnRef idx="2">
+            <a:schemeClr val="accent1">
+              <a:shade val="50000"/>
+            </a:schemeClr>
+          </a:lnRef>
+          <a:fillRef idx="1">
+            <a:schemeClr val="accent1"/>
+          </a:fillRef>
+          <a:effectRef idx="0">
+            <a:schemeClr val="accent1"/>
+          </a:effectRef>
+          <a:fontRef idx="minor">
+            <a:schemeClr val="lt1"/>
+          </a:fontRef>
+        </p:style>
+        <p:txBody>
+          <a:bodyPr rtlCol="0" anchor="ctr"/>
+          <a:lstStyle/>
+          <a:p>
+            <a:pPr algn="ctr"/>
+            <a:endParaRPr lang="zh-CN" altLang="en-US" dirty="0"/>
+          </a:p>
+        </p:txBody>
+      </p:sp>
+      <p:sp>
+        <p:nvSpPr>
+          <p:cNvPr id="4" name="矩形: 圆角 3">
+            <a:extLst>
+              <a:ext uri="{FF2B5EF4-FFF2-40B4-BE49-F238E27FC236}">
+                <a16:creationId xmlns:a16="http://schemas.microsoft.com/office/drawing/2014/main" id="{F910AA8D-51CA-F99C-6EEF-20BC61F0A1A7}"/>
+              </a:ext>
+            </a:extLst>
+          </p:cNvPr>
+          <p:cNvSpPr/>
+          <p:nvPr/>
+        </p:nvSpPr>
+        <p:spPr>
+          <a:xfrm>
+            <a:off x="2863703" y="622005"/>
+            <a:ext cx="5940056" cy="3127744"/>
+          </a:xfrm>
+          <a:prstGeom prst="roundRect">
+            <a:avLst/>
+          </a:prstGeom>
+          <a:solidFill>
+            <a:schemeClr val="accent1">
+              <a:lumMod val="40000"/>
+              <a:lumOff val="60000"/>
+            </a:schemeClr>
+          </a:solidFill>
+          <a:ln>
+            <a:noFill/>
+          </a:ln>
+        </p:spPr>
+        <p:style>
+          <a:lnRef idx="2">
+            <a:schemeClr val="accent1">
+              <a:shade val="50000"/>
+            </a:schemeClr>
+          </a:lnRef>
+          <a:fillRef idx="1">
+            <a:schemeClr val="accent1"/>
+          </a:fillRef>
+          <a:effectRef idx="0">
+            <a:schemeClr val="accent1"/>
+          </a:effectRef>
+          <a:fontRef idx="minor">
+            <a:schemeClr val="lt1"/>
+          </a:fontRef>
+        </p:style>
+        <p:txBody>
+          <a:bodyPr rtlCol="0" anchor="ctr"/>
+          <a:lstStyle/>
+          <a:p>
+            <a:pPr algn="ctr"/>
+            <a:endParaRPr lang="zh-CN" altLang="en-US" dirty="0"/>
+          </a:p>
+        </p:txBody>
+      </p:sp>
+      <p:sp>
+        <p:nvSpPr>
+          <p:cNvPr id="5" name="矩形: 圆角 4">
+            <a:extLst>
+              <a:ext uri="{FF2B5EF4-FFF2-40B4-BE49-F238E27FC236}">
+                <a16:creationId xmlns:a16="http://schemas.microsoft.com/office/drawing/2014/main" id="{86361FD9-770B-34E7-4361-170AB79ADEC6}"/>
+              </a:ext>
+            </a:extLst>
+          </p:cNvPr>
+          <p:cNvSpPr/>
+          <p:nvPr/>
+        </p:nvSpPr>
+        <p:spPr>
+          <a:xfrm>
+            <a:off x="2863703" y="3985438"/>
+            <a:ext cx="5940056" cy="1723212"/>
+          </a:xfrm>
+          <a:prstGeom prst="roundRect">
+            <a:avLst/>
+          </a:prstGeom>
+          <a:solidFill>
+            <a:schemeClr val="accent1">
+              <a:lumMod val="40000"/>
+              <a:lumOff val="60000"/>
+            </a:schemeClr>
+          </a:solidFill>
+          <a:ln>
+            <a:noFill/>
+          </a:ln>
+        </p:spPr>
+        <p:style>
+          <a:lnRef idx="2">
+            <a:schemeClr val="accent1">
+              <a:shade val="50000"/>
+            </a:schemeClr>
+          </a:lnRef>
+          <a:fillRef idx="1">
+            <a:schemeClr val="accent1"/>
+          </a:fillRef>
+          <a:effectRef idx="0">
+            <a:schemeClr val="accent1"/>
+          </a:effectRef>
+          <a:fontRef idx="minor">
+            <a:schemeClr val="lt1"/>
+          </a:fontRef>
+        </p:style>
+        <p:txBody>
+          <a:bodyPr rtlCol="0" anchor="ctr"/>
+          <a:lstStyle/>
+          <a:p>
+            <a:pPr algn="ctr"/>
+            <a:endParaRPr lang="zh-CN" altLang="en-US" dirty="0"/>
+          </a:p>
+        </p:txBody>
+      </p:sp>
+      <p:sp>
+        <p:nvSpPr>
+          <p:cNvPr id="6" name="矩形: 圆角 5">
+            <a:extLst>
+              <a:ext uri="{FF2B5EF4-FFF2-40B4-BE49-F238E27FC236}">
+                <a16:creationId xmlns:a16="http://schemas.microsoft.com/office/drawing/2014/main" id="{ABD537E7-C3A5-B1E5-C8FE-BDD22E3AC83E}"/>
+              </a:ext>
+            </a:extLst>
+          </p:cNvPr>
+          <p:cNvSpPr/>
+          <p:nvPr/>
+        </p:nvSpPr>
+        <p:spPr>
+          <a:xfrm>
+            <a:off x="3296091" y="992373"/>
+            <a:ext cx="1410587" cy="1346790"/>
+          </a:xfrm>
+          <a:prstGeom prst="roundRect">
+            <a:avLst/>
+          </a:prstGeom>
+          <a:solidFill>
+            <a:schemeClr val="accent1">
+              <a:lumMod val="75000"/>
+            </a:schemeClr>
+          </a:solidFill>
+          <a:ln>
+            <a:noFill/>
+          </a:ln>
+        </p:spPr>
+        <p:style>
+          <a:lnRef idx="2">
+            <a:schemeClr val="accent1">
+              <a:shade val="50000"/>
+            </a:schemeClr>
+          </a:lnRef>
+          <a:fillRef idx="1">
+            <a:schemeClr val="accent1"/>
+          </a:fillRef>
+          <a:effectRef idx="0">
+            <a:schemeClr val="accent1"/>
+          </a:effectRef>
+          <a:fontRef idx="minor">
+            <a:schemeClr val="lt1"/>
+          </a:fontRef>
+        </p:style>
+        <p:txBody>
+          <a:bodyPr rtlCol="0" anchor="ctr"/>
+          <a:lstStyle/>
+          <a:p>
+            <a:pPr algn="ctr"/>
+            <a:endParaRPr lang="zh-CN" altLang="en-US"/>
+          </a:p>
+        </p:txBody>
+      </p:sp>
+      <p:sp>
+        <p:nvSpPr>
+          <p:cNvPr id="10" name="矩形: 圆角 9">
+            <a:extLst>
+              <a:ext uri="{FF2B5EF4-FFF2-40B4-BE49-F238E27FC236}">
+                <a16:creationId xmlns:a16="http://schemas.microsoft.com/office/drawing/2014/main" id="{241559A1-D0F7-A30F-1284-7F2B7CC3697F}"/>
+              </a:ext>
+            </a:extLst>
+          </p:cNvPr>
+          <p:cNvSpPr/>
+          <p:nvPr/>
+        </p:nvSpPr>
+        <p:spPr>
+          <a:xfrm>
+            <a:off x="6971412" y="992373"/>
+            <a:ext cx="1410587" cy="1346790"/>
+          </a:xfrm>
+          <a:prstGeom prst="roundRect">
+            <a:avLst/>
+          </a:prstGeom>
+          <a:solidFill>
+            <a:schemeClr val="accent1">
+              <a:lumMod val="75000"/>
+            </a:schemeClr>
+          </a:solidFill>
+          <a:ln>
+            <a:noFill/>
+          </a:ln>
+        </p:spPr>
+        <p:style>
+          <a:lnRef idx="2">
+            <a:schemeClr val="accent1">
+              <a:shade val="50000"/>
+            </a:schemeClr>
+          </a:lnRef>
+          <a:fillRef idx="1">
+            <a:schemeClr val="accent1"/>
+          </a:fillRef>
+          <a:effectRef idx="0">
+            <a:schemeClr val="accent1"/>
+          </a:effectRef>
+          <a:fontRef idx="minor">
+            <a:schemeClr val="lt1"/>
+          </a:fontRef>
+        </p:style>
+        <p:txBody>
+          <a:bodyPr rtlCol="0" anchor="ctr"/>
+          <a:lstStyle/>
+          <a:p>
+            <a:pPr algn="ctr"/>
+            <a:endParaRPr lang="zh-CN" altLang="en-US"/>
+          </a:p>
+        </p:txBody>
+      </p:sp>
+      <p:cxnSp>
+        <p:nvCxnSpPr>
+          <p:cNvPr id="18" name="直接连接符 17">
+            <a:extLst>
+              <a:ext uri="{FF2B5EF4-FFF2-40B4-BE49-F238E27FC236}">
+                <a16:creationId xmlns:a16="http://schemas.microsoft.com/office/drawing/2014/main" id="{DC252060-9345-4899-2254-C4210E2F2105}"/>
+              </a:ext>
+            </a:extLst>
+          </p:cNvPr>
+          <p:cNvCxnSpPr>
+            <a:cxnSpLocks/>
+            <a:stCxn id="11" idx="0"/>
+            <a:endCxn id="6" idx="2"/>
+          </p:cNvCxnSpPr>
+          <p:nvPr/>
+        </p:nvCxnSpPr>
+        <p:spPr>
+          <a:xfrm flipV="1">
+            <a:off x="3384697" y="2339163"/>
+            <a:ext cx="616688" cy="1780954"/>
+          </a:xfrm>
+          <a:prstGeom prst="line">
+            <a:avLst/>
+          </a:prstGeom>
+          <a:ln w="28575">
+            <a:solidFill>
+              <a:schemeClr val="accent1">
+                <a:lumMod val="75000"/>
+              </a:schemeClr>
+            </a:solidFill>
+          </a:ln>
+        </p:spPr>
+        <p:style>
+          <a:lnRef idx="1">
+            <a:schemeClr val="accent2"/>
+          </a:lnRef>
+          <a:fillRef idx="0">
+            <a:schemeClr val="accent2"/>
+          </a:fillRef>
+          <a:effectRef idx="0">
+            <a:schemeClr val="accent2"/>
+          </a:effectRef>
+          <a:fontRef idx="minor">
+            <a:schemeClr val="tx1"/>
+          </a:fontRef>
+        </p:style>
+      </p:cxnSp>
+      <p:cxnSp>
+        <p:nvCxnSpPr>
+          <p:cNvPr id="19" name="直接连接符 18">
+            <a:extLst>
+              <a:ext uri="{FF2B5EF4-FFF2-40B4-BE49-F238E27FC236}">
+                <a16:creationId xmlns:a16="http://schemas.microsoft.com/office/drawing/2014/main" id="{D0D7A374-1C59-9CF6-6662-AD5C19AF1785}"/>
+              </a:ext>
+            </a:extLst>
+          </p:cNvPr>
+          <p:cNvCxnSpPr>
+            <a:cxnSpLocks/>
+            <a:stCxn id="12" idx="0"/>
+            <a:endCxn id="6" idx="2"/>
+          </p:cNvCxnSpPr>
+          <p:nvPr/>
+        </p:nvCxnSpPr>
+        <p:spPr>
+          <a:xfrm flipH="1" flipV="1">
+            <a:off x="4001385" y="2339163"/>
+            <a:ext cx="340241" cy="1767337"/>
+          </a:xfrm>
+          <a:prstGeom prst="line">
+            <a:avLst/>
+          </a:prstGeom>
+          <a:ln w="28575">
+            <a:solidFill>
+              <a:schemeClr val="accent1">
+                <a:lumMod val="75000"/>
+              </a:schemeClr>
+            </a:solidFill>
+          </a:ln>
+        </p:spPr>
+        <p:style>
+          <a:lnRef idx="1">
+            <a:schemeClr val="accent2"/>
+          </a:lnRef>
+          <a:fillRef idx="0">
+            <a:schemeClr val="accent2"/>
+          </a:fillRef>
+          <a:effectRef idx="0">
+            <a:schemeClr val="accent2"/>
+          </a:effectRef>
+          <a:fontRef idx="minor">
+            <a:schemeClr val="tx1"/>
+          </a:fontRef>
+        </p:style>
+      </p:cxnSp>
+      <p:cxnSp>
+        <p:nvCxnSpPr>
+          <p:cNvPr id="22" name="直接连接符 21">
+            <a:extLst>
+              <a:ext uri="{FF2B5EF4-FFF2-40B4-BE49-F238E27FC236}">
+                <a16:creationId xmlns:a16="http://schemas.microsoft.com/office/drawing/2014/main" id="{626531CD-21F9-AB0C-015D-8AFB52859564}"/>
+              </a:ext>
+            </a:extLst>
+          </p:cNvPr>
+          <p:cNvCxnSpPr>
+            <a:cxnSpLocks/>
+            <a:stCxn id="13" idx="0"/>
+            <a:endCxn id="9" idx="2"/>
+          </p:cNvCxnSpPr>
+          <p:nvPr/>
+        </p:nvCxnSpPr>
+        <p:spPr>
+          <a:xfrm flipV="1">
+            <a:off x="5298555" y="3618615"/>
+            <a:ext cx="545805" cy="487884"/>
+          </a:xfrm>
+          <a:prstGeom prst="line">
+            <a:avLst/>
+          </a:prstGeom>
+          <a:ln w="28575">
+            <a:solidFill>
+              <a:schemeClr val="accent1">
+                <a:lumMod val="75000"/>
+              </a:schemeClr>
+            </a:solidFill>
+          </a:ln>
+        </p:spPr>
+        <p:style>
+          <a:lnRef idx="1">
+            <a:schemeClr val="accent2"/>
+          </a:lnRef>
+          <a:fillRef idx="0">
+            <a:schemeClr val="accent2"/>
+          </a:fillRef>
+          <a:effectRef idx="0">
+            <a:schemeClr val="accent2"/>
+          </a:effectRef>
+          <a:fontRef idx="minor">
+            <a:schemeClr val="tx1"/>
+          </a:fontRef>
+        </p:style>
+      </p:cxnSp>
+      <p:cxnSp>
+        <p:nvCxnSpPr>
+          <p:cNvPr id="25" name="直接连接符 24">
+            <a:extLst>
+              <a:ext uri="{FF2B5EF4-FFF2-40B4-BE49-F238E27FC236}">
+                <a16:creationId xmlns:a16="http://schemas.microsoft.com/office/drawing/2014/main" id="{E9E98F28-2EA3-5011-04D6-616C405AE7E4}"/>
+              </a:ext>
+            </a:extLst>
+          </p:cNvPr>
+          <p:cNvCxnSpPr>
+            <a:cxnSpLocks/>
+            <a:stCxn id="14" idx="0"/>
+            <a:endCxn id="9" idx="2"/>
+          </p:cNvCxnSpPr>
+          <p:nvPr/>
+        </p:nvCxnSpPr>
+        <p:spPr>
+          <a:xfrm flipH="1" flipV="1">
+            <a:off x="5844360" y="3618615"/>
+            <a:ext cx="411124" cy="487883"/>
+          </a:xfrm>
+          <a:prstGeom prst="line">
+            <a:avLst/>
+          </a:prstGeom>
+          <a:ln w="28575">
+            <a:solidFill>
+              <a:schemeClr val="accent1">
+                <a:lumMod val="75000"/>
+              </a:schemeClr>
+            </a:solidFill>
+          </a:ln>
+        </p:spPr>
+        <p:style>
+          <a:lnRef idx="1">
+            <a:schemeClr val="accent2"/>
+          </a:lnRef>
+          <a:fillRef idx="0">
+            <a:schemeClr val="accent2"/>
+          </a:fillRef>
+          <a:effectRef idx="0">
+            <a:schemeClr val="accent2"/>
+          </a:effectRef>
+          <a:fontRef idx="minor">
+            <a:schemeClr val="tx1"/>
+          </a:fontRef>
+        </p:style>
+      </p:cxnSp>
+      <p:cxnSp>
+        <p:nvCxnSpPr>
+          <p:cNvPr id="28" name="直接连接符 27">
+            <a:extLst>
+              <a:ext uri="{FF2B5EF4-FFF2-40B4-BE49-F238E27FC236}">
+                <a16:creationId xmlns:a16="http://schemas.microsoft.com/office/drawing/2014/main" id="{9F14FEA2-D107-FE94-AAF3-1BAD352FF1B7}"/>
+              </a:ext>
+            </a:extLst>
+          </p:cNvPr>
+          <p:cNvCxnSpPr>
+            <a:cxnSpLocks/>
+          </p:cNvCxnSpPr>
+          <p:nvPr/>
+        </p:nvCxnSpPr>
+        <p:spPr>
+          <a:xfrm flipV="1">
+            <a:off x="7208874" y="2333109"/>
+            <a:ext cx="425847" cy="1773388"/>
+          </a:xfrm>
+          <a:prstGeom prst="line">
+            <a:avLst/>
+          </a:prstGeom>
+          <a:ln w="28575">
+            <a:solidFill>
+              <a:schemeClr val="accent1">
+                <a:lumMod val="75000"/>
+              </a:schemeClr>
+            </a:solidFill>
+          </a:ln>
+        </p:spPr>
+        <p:style>
+          <a:lnRef idx="1">
+            <a:schemeClr val="accent2"/>
+          </a:lnRef>
+          <a:fillRef idx="0">
+            <a:schemeClr val="accent2"/>
+          </a:fillRef>
+          <a:effectRef idx="0">
+            <a:schemeClr val="accent2"/>
+          </a:effectRef>
+          <a:fontRef idx="minor">
+            <a:schemeClr val="tx1"/>
+          </a:fontRef>
+        </p:style>
+      </p:cxnSp>
+      <p:cxnSp>
+        <p:nvCxnSpPr>
+          <p:cNvPr id="31" name="直接连接符 30">
+            <a:extLst>
+              <a:ext uri="{FF2B5EF4-FFF2-40B4-BE49-F238E27FC236}">
+                <a16:creationId xmlns:a16="http://schemas.microsoft.com/office/drawing/2014/main" id="{87B8072A-E802-51AF-8C0E-DA2C54B811C8}"/>
+              </a:ext>
+            </a:extLst>
+          </p:cNvPr>
+          <p:cNvCxnSpPr>
+            <a:cxnSpLocks/>
+            <a:stCxn id="16" idx="0"/>
+            <a:endCxn id="10" idx="2"/>
+          </p:cNvCxnSpPr>
+          <p:nvPr/>
+        </p:nvCxnSpPr>
+        <p:spPr>
+          <a:xfrm flipH="1" flipV="1">
+            <a:off x="7676706" y="2339163"/>
+            <a:ext cx="535157" cy="1767334"/>
+          </a:xfrm>
+          <a:prstGeom prst="line">
+            <a:avLst/>
+          </a:prstGeom>
+          <a:ln w="28575">
+            <a:solidFill>
+              <a:schemeClr val="accent1">
+                <a:lumMod val="75000"/>
+              </a:schemeClr>
+            </a:solidFill>
+          </a:ln>
+        </p:spPr>
+        <p:style>
+          <a:lnRef idx="1">
+            <a:schemeClr val="accent2"/>
+          </a:lnRef>
+          <a:fillRef idx="0">
+            <a:schemeClr val="accent2"/>
+          </a:fillRef>
+          <a:effectRef idx="0">
+            <a:schemeClr val="accent2"/>
+          </a:effectRef>
+          <a:fontRef idx="minor">
+            <a:schemeClr val="tx1"/>
+          </a:fontRef>
+        </p:style>
+      </p:cxnSp>
+      <p:sp>
+        <p:nvSpPr>
+          <p:cNvPr id="11" name="矩形: 圆角 10">
+            <a:extLst>
+              <a:ext uri="{FF2B5EF4-FFF2-40B4-BE49-F238E27FC236}">
+                <a16:creationId xmlns:a16="http://schemas.microsoft.com/office/drawing/2014/main" id="{059C9DA5-8721-52C8-D6B8-2E96CDB82854}"/>
+              </a:ext>
+            </a:extLst>
+          </p:cNvPr>
+          <p:cNvSpPr/>
+          <p:nvPr/>
+        </p:nvSpPr>
+        <p:spPr>
+          <a:xfrm>
+            <a:off x="3019645" y="4120117"/>
+            <a:ext cx="730104" cy="1104013"/>
+          </a:xfrm>
+          <a:prstGeom prst="roundRect">
+            <a:avLst/>
+          </a:prstGeom>
+          <a:solidFill>
+            <a:schemeClr val="accent1">
+              <a:lumMod val="75000"/>
+            </a:schemeClr>
+          </a:solidFill>
+          <a:ln>
+            <a:noFill/>
+          </a:ln>
+        </p:spPr>
+        <p:style>
+          <a:lnRef idx="2">
+            <a:schemeClr val="accent1">
+              <a:shade val="50000"/>
+            </a:schemeClr>
+          </a:lnRef>
+          <a:fillRef idx="1">
+            <a:schemeClr val="accent1"/>
+          </a:fillRef>
+          <a:effectRef idx="0">
+            <a:schemeClr val="accent1"/>
+          </a:effectRef>
+          <a:fontRef idx="minor">
+            <a:schemeClr val="lt1"/>
+          </a:fontRef>
+        </p:style>
+        <p:txBody>
+          <a:bodyPr rtlCol="0" anchor="ctr"/>
+          <a:lstStyle/>
+          <a:p>
+            <a:pPr algn="ctr"/>
+            <a:endParaRPr lang="zh-CN" altLang="en-US" dirty="0"/>
+          </a:p>
+        </p:txBody>
+      </p:sp>
+      <p:sp>
+        <p:nvSpPr>
+          <p:cNvPr id="12" name="矩形: 圆角 11">
+            <a:extLst>
+              <a:ext uri="{FF2B5EF4-FFF2-40B4-BE49-F238E27FC236}">
+                <a16:creationId xmlns:a16="http://schemas.microsoft.com/office/drawing/2014/main" id="{7D77CBB9-6DED-810B-6051-9080949F16E3}"/>
+              </a:ext>
+            </a:extLst>
+          </p:cNvPr>
+          <p:cNvSpPr/>
+          <p:nvPr/>
+        </p:nvSpPr>
+        <p:spPr>
+          <a:xfrm>
+            <a:off x="3976574" y="4106500"/>
+            <a:ext cx="730104" cy="1104013"/>
+          </a:xfrm>
+          <a:prstGeom prst="roundRect">
+            <a:avLst/>
+          </a:prstGeom>
+          <a:solidFill>
+            <a:schemeClr val="accent1">
+              <a:lumMod val="75000"/>
+            </a:schemeClr>
+          </a:solidFill>
+          <a:ln>
+            <a:noFill/>
+          </a:ln>
+        </p:spPr>
+        <p:style>
+          <a:lnRef idx="2">
+            <a:schemeClr val="accent1">
+              <a:shade val="50000"/>
+            </a:schemeClr>
+          </a:lnRef>
+          <a:fillRef idx="1">
+            <a:schemeClr val="accent1"/>
+          </a:fillRef>
+          <a:effectRef idx="0">
+            <a:schemeClr val="accent1"/>
+          </a:effectRef>
+          <a:fontRef idx="minor">
+            <a:schemeClr val="lt1"/>
+          </a:fontRef>
+        </p:style>
+        <p:txBody>
+          <a:bodyPr rtlCol="0" anchor="ctr"/>
+          <a:lstStyle/>
+          <a:p>
+            <a:pPr algn="ctr"/>
+            <a:endParaRPr lang="zh-CN" altLang="en-US" dirty="0"/>
+          </a:p>
+        </p:txBody>
+      </p:sp>
+      <p:sp>
+        <p:nvSpPr>
+          <p:cNvPr id="13" name="矩形: 圆角 12">
+            <a:extLst>
+              <a:ext uri="{FF2B5EF4-FFF2-40B4-BE49-F238E27FC236}">
+                <a16:creationId xmlns:a16="http://schemas.microsoft.com/office/drawing/2014/main" id="{B372E381-55D0-C0E0-AA34-6A0331BFD5DA}"/>
+              </a:ext>
+            </a:extLst>
+          </p:cNvPr>
+          <p:cNvSpPr/>
+          <p:nvPr/>
+        </p:nvSpPr>
+        <p:spPr>
+          <a:xfrm>
+            <a:off x="4933503" y="4106499"/>
+            <a:ext cx="730104" cy="1104013"/>
+          </a:xfrm>
+          <a:prstGeom prst="roundRect">
+            <a:avLst/>
+          </a:prstGeom>
+          <a:solidFill>
+            <a:schemeClr val="accent1">
+              <a:lumMod val="75000"/>
+            </a:schemeClr>
+          </a:solidFill>
+          <a:ln>
+            <a:noFill/>
+          </a:ln>
+        </p:spPr>
+        <p:style>
+          <a:lnRef idx="2">
+            <a:schemeClr val="accent1">
+              <a:shade val="50000"/>
+            </a:schemeClr>
+          </a:lnRef>
+          <a:fillRef idx="1">
+            <a:schemeClr val="accent1"/>
+          </a:fillRef>
+          <a:effectRef idx="0">
+            <a:schemeClr val="accent1"/>
+          </a:effectRef>
+          <a:fontRef idx="minor">
+            <a:schemeClr val="lt1"/>
+          </a:fontRef>
+        </p:style>
+        <p:txBody>
+          <a:bodyPr rtlCol="0" anchor="ctr"/>
+          <a:lstStyle/>
+          <a:p>
+            <a:pPr algn="ctr"/>
+            <a:endParaRPr lang="zh-CN" altLang="en-US" dirty="0"/>
+          </a:p>
+        </p:txBody>
+      </p:sp>
+      <p:sp>
+        <p:nvSpPr>
+          <p:cNvPr id="14" name="矩形: 圆角 13">
+            <a:extLst>
+              <a:ext uri="{FF2B5EF4-FFF2-40B4-BE49-F238E27FC236}">
+                <a16:creationId xmlns:a16="http://schemas.microsoft.com/office/drawing/2014/main" id="{8BFE76CD-F2D7-34E4-1CB5-3CAED748452F}"/>
+              </a:ext>
+            </a:extLst>
+          </p:cNvPr>
+          <p:cNvSpPr/>
+          <p:nvPr/>
+        </p:nvSpPr>
+        <p:spPr>
+          <a:xfrm>
+            <a:off x="5890432" y="4106498"/>
+            <a:ext cx="730104" cy="1104013"/>
+          </a:xfrm>
+          <a:prstGeom prst="roundRect">
+            <a:avLst/>
+          </a:prstGeom>
+          <a:solidFill>
+            <a:schemeClr val="accent1">
+              <a:lumMod val="75000"/>
+            </a:schemeClr>
+          </a:solidFill>
+          <a:ln>
+            <a:noFill/>
+          </a:ln>
+        </p:spPr>
+        <p:style>
+          <a:lnRef idx="2">
+            <a:schemeClr val="accent1">
+              <a:shade val="50000"/>
+            </a:schemeClr>
+          </a:lnRef>
+          <a:fillRef idx="1">
+            <a:schemeClr val="accent1"/>
+          </a:fillRef>
+          <a:effectRef idx="0">
+            <a:schemeClr val="accent1"/>
+          </a:effectRef>
+          <a:fontRef idx="minor">
+            <a:schemeClr val="lt1"/>
+          </a:fontRef>
+        </p:style>
+        <p:txBody>
+          <a:bodyPr rtlCol="0" anchor="ctr"/>
+          <a:lstStyle/>
+          <a:p>
+            <a:pPr algn="ctr"/>
+            <a:endParaRPr lang="zh-CN" altLang="en-US" dirty="0"/>
+          </a:p>
+        </p:txBody>
+      </p:sp>
+      <p:sp>
+        <p:nvSpPr>
+          <p:cNvPr id="15" name="矩形: 圆角 14">
+            <a:extLst>
+              <a:ext uri="{FF2B5EF4-FFF2-40B4-BE49-F238E27FC236}">
+                <a16:creationId xmlns:a16="http://schemas.microsoft.com/office/drawing/2014/main" id="{78205C83-2E33-DEC5-92C3-A4902B53777E}"/>
+              </a:ext>
+            </a:extLst>
+          </p:cNvPr>
+          <p:cNvSpPr/>
+          <p:nvPr/>
+        </p:nvSpPr>
+        <p:spPr>
+          <a:xfrm>
+            <a:off x="6847361" y="4106498"/>
+            <a:ext cx="730104" cy="1104013"/>
+          </a:xfrm>
+          <a:prstGeom prst="roundRect">
+            <a:avLst/>
+          </a:prstGeom>
+          <a:solidFill>
+            <a:schemeClr val="accent1">
+              <a:lumMod val="75000"/>
+            </a:schemeClr>
+          </a:solidFill>
+          <a:ln>
+            <a:noFill/>
+          </a:ln>
+        </p:spPr>
+        <p:style>
+          <a:lnRef idx="2">
+            <a:schemeClr val="accent1">
+              <a:shade val="50000"/>
+            </a:schemeClr>
+          </a:lnRef>
+          <a:fillRef idx="1">
+            <a:schemeClr val="accent1"/>
+          </a:fillRef>
+          <a:effectRef idx="0">
+            <a:schemeClr val="accent1"/>
+          </a:effectRef>
+          <a:fontRef idx="minor">
+            <a:schemeClr val="lt1"/>
+          </a:fontRef>
+        </p:style>
+        <p:txBody>
+          <a:bodyPr rtlCol="0" anchor="ctr"/>
+          <a:lstStyle/>
+          <a:p>
+            <a:pPr algn="ctr"/>
+            <a:endParaRPr lang="zh-CN" altLang="en-US" dirty="0"/>
+          </a:p>
+        </p:txBody>
+      </p:sp>
+      <p:sp>
+        <p:nvSpPr>
+          <p:cNvPr id="16" name="矩形: 圆角 15">
+            <a:extLst>
+              <a:ext uri="{FF2B5EF4-FFF2-40B4-BE49-F238E27FC236}">
+                <a16:creationId xmlns:a16="http://schemas.microsoft.com/office/drawing/2014/main" id="{652E7DAA-4BB8-A7E0-AF89-61EFC4E80CFE}"/>
+              </a:ext>
+            </a:extLst>
+          </p:cNvPr>
+          <p:cNvSpPr/>
+          <p:nvPr/>
+        </p:nvSpPr>
+        <p:spPr>
+          <a:xfrm>
+            <a:off x="7846811" y="4106497"/>
+            <a:ext cx="730104" cy="1117633"/>
+          </a:xfrm>
+          <a:prstGeom prst="roundRect">
+            <a:avLst/>
+          </a:prstGeom>
+          <a:solidFill>
+            <a:schemeClr val="accent1">
+              <a:lumMod val="75000"/>
+            </a:schemeClr>
+          </a:solidFill>
+          <a:ln>
+            <a:noFill/>
+          </a:ln>
+        </p:spPr>
+        <p:style>
+          <a:lnRef idx="2">
+            <a:schemeClr val="accent1">
+              <a:shade val="50000"/>
+            </a:schemeClr>
+          </a:lnRef>
+          <a:fillRef idx="1">
+            <a:schemeClr val="accent1"/>
+          </a:fillRef>
+          <a:effectRef idx="0">
+            <a:schemeClr val="accent1"/>
+          </a:effectRef>
+          <a:fontRef idx="minor">
+            <a:schemeClr val="lt1"/>
+          </a:fontRef>
+        </p:style>
+        <p:txBody>
+          <a:bodyPr rtlCol="0" anchor="ctr"/>
+          <a:lstStyle/>
+          <a:p>
+            <a:pPr algn="ctr"/>
+            <a:endParaRPr lang="zh-CN" altLang="en-US" dirty="0"/>
+          </a:p>
+        </p:txBody>
+      </p:sp>
+      <p:cxnSp>
+        <p:nvCxnSpPr>
+          <p:cNvPr id="34" name="直接连接符 33">
+            <a:extLst>
+              <a:ext uri="{FF2B5EF4-FFF2-40B4-BE49-F238E27FC236}">
+                <a16:creationId xmlns:a16="http://schemas.microsoft.com/office/drawing/2014/main" id="{005D8849-0C26-D96F-2E41-1FF89FBDE7EE}"/>
+              </a:ext>
+            </a:extLst>
+          </p:cNvPr>
+          <p:cNvCxnSpPr>
+            <a:cxnSpLocks/>
+            <a:stCxn id="6" idx="3"/>
+            <a:endCxn id="10" idx="1"/>
+          </p:cNvCxnSpPr>
+          <p:nvPr/>
+        </p:nvCxnSpPr>
+        <p:spPr>
+          <a:xfrm>
+            <a:off x="4706678" y="1665768"/>
+            <a:ext cx="2264734" cy="0"/>
+          </a:xfrm>
+          <a:prstGeom prst="line">
+            <a:avLst/>
+          </a:prstGeom>
+          <a:ln w="28575">
+            <a:solidFill>
+              <a:schemeClr val="accent1">
+                <a:lumMod val="75000"/>
+              </a:schemeClr>
+            </a:solidFill>
+          </a:ln>
+        </p:spPr>
+        <p:style>
+          <a:lnRef idx="1">
+            <a:schemeClr val="accent2"/>
+          </a:lnRef>
+          <a:fillRef idx="0">
+            <a:schemeClr val="accent2"/>
+          </a:fillRef>
+          <a:effectRef idx="0">
+            <a:schemeClr val="accent2"/>
+          </a:effectRef>
+          <a:fontRef idx="minor">
+            <a:schemeClr val="tx1"/>
+          </a:fontRef>
+        </p:style>
+      </p:cxnSp>
+      <p:cxnSp>
+        <p:nvCxnSpPr>
+          <p:cNvPr id="38" name="直接连接符 37">
+            <a:extLst>
+              <a:ext uri="{FF2B5EF4-FFF2-40B4-BE49-F238E27FC236}">
+                <a16:creationId xmlns:a16="http://schemas.microsoft.com/office/drawing/2014/main" id="{714E6C37-C5DC-758A-1F6F-5980E2A84A9F}"/>
+              </a:ext>
+            </a:extLst>
+          </p:cNvPr>
+          <p:cNvCxnSpPr>
+            <a:cxnSpLocks/>
+            <a:stCxn id="9" idx="3"/>
+          </p:cNvCxnSpPr>
+          <p:nvPr/>
+        </p:nvCxnSpPr>
+        <p:spPr>
+          <a:xfrm flipV="1">
+            <a:off x="6549653" y="2339163"/>
+            <a:ext cx="1134142" cy="606057"/>
+          </a:xfrm>
+          <a:prstGeom prst="line">
+            <a:avLst/>
+          </a:prstGeom>
+          <a:ln w="28575">
+            <a:solidFill>
+              <a:schemeClr val="accent1">
+                <a:lumMod val="75000"/>
+              </a:schemeClr>
+            </a:solidFill>
+          </a:ln>
+        </p:spPr>
+        <p:style>
+          <a:lnRef idx="1">
+            <a:schemeClr val="accent2"/>
+          </a:lnRef>
+          <a:fillRef idx="0">
+            <a:schemeClr val="accent2"/>
+          </a:fillRef>
+          <a:effectRef idx="0">
+            <a:schemeClr val="accent2"/>
+          </a:effectRef>
+          <a:fontRef idx="minor">
+            <a:schemeClr val="tx1"/>
+          </a:fontRef>
+        </p:style>
+      </p:cxnSp>
+      <p:cxnSp>
+        <p:nvCxnSpPr>
+          <p:cNvPr id="41" name="直接连接符 40">
+            <a:extLst>
+              <a:ext uri="{FF2B5EF4-FFF2-40B4-BE49-F238E27FC236}">
+                <a16:creationId xmlns:a16="http://schemas.microsoft.com/office/drawing/2014/main" id="{5D2D3E7B-99BF-47F8-33F8-ED07B1424CD6}"/>
+              </a:ext>
+            </a:extLst>
+          </p:cNvPr>
+          <p:cNvCxnSpPr>
+            <a:cxnSpLocks/>
+            <a:stCxn id="6" idx="2"/>
+            <a:endCxn id="9" idx="1"/>
+          </p:cNvCxnSpPr>
+          <p:nvPr/>
+        </p:nvCxnSpPr>
+        <p:spPr>
+          <a:xfrm>
+            <a:off x="4001385" y="2339163"/>
+            <a:ext cx="1137681" cy="606057"/>
+          </a:xfrm>
+          <a:prstGeom prst="line">
+            <a:avLst/>
+          </a:prstGeom>
+          <a:ln w="28575">
+            <a:solidFill>
+              <a:schemeClr val="accent1">
+                <a:lumMod val="75000"/>
+              </a:schemeClr>
+            </a:solidFill>
+          </a:ln>
+        </p:spPr>
+        <p:style>
+          <a:lnRef idx="1">
+            <a:schemeClr val="accent2"/>
+          </a:lnRef>
+          <a:fillRef idx="0">
+            <a:schemeClr val="accent2"/>
+          </a:fillRef>
+          <a:effectRef idx="0">
+            <a:schemeClr val="accent2"/>
+          </a:effectRef>
+          <a:fontRef idx="minor">
+            <a:schemeClr val="tx1"/>
+          </a:fontRef>
+        </p:style>
+      </p:cxnSp>
+      <p:cxnSp>
+        <p:nvCxnSpPr>
+          <p:cNvPr id="44" name="直接连接符 43">
+            <a:extLst>
+              <a:ext uri="{FF2B5EF4-FFF2-40B4-BE49-F238E27FC236}">
+                <a16:creationId xmlns:a16="http://schemas.microsoft.com/office/drawing/2014/main" id="{52A6E82B-D851-10AE-3DA3-2622B39556ED}"/>
+              </a:ext>
+            </a:extLst>
+          </p:cNvPr>
+          <p:cNvCxnSpPr>
+            <a:cxnSpLocks/>
+            <a:endCxn id="10" idx="3"/>
+          </p:cNvCxnSpPr>
+          <p:nvPr/>
+        </p:nvCxnSpPr>
+        <p:spPr>
+          <a:xfrm flipH="1">
+            <a:off x="8381999" y="1665767"/>
+            <a:ext cx="1485901" cy="1"/>
+          </a:xfrm>
+          <a:prstGeom prst="line">
+            <a:avLst/>
+          </a:prstGeom>
+          <a:ln w="28575">
+            <a:solidFill>
+              <a:schemeClr val="accent1">
+                <a:lumMod val="75000"/>
+              </a:schemeClr>
+            </a:solidFill>
+          </a:ln>
+        </p:spPr>
+        <p:style>
+          <a:lnRef idx="1">
+            <a:schemeClr val="accent2"/>
+          </a:lnRef>
+          <a:fillRef idx="0">
+            <a:schemeClr val="accent2"/>
+          </a:fillRef>
+          <a:effectRef idx="0">
+            <a:schemeClr val="accent2"/>
+          </a:effectRef>
+          <a:fontRef idx="minor">
+            <a:schemeClr val="tx1"/>
+          </a:fontRef>
+        </p:style>
+      </p:cxnSp>
+      <p:sp>
+        <p:nvSpPr>
+          <p:cNvPr id="48" name="文本框 47">
+            <a:extLst>
+              <a:ext uri="{FF2B5EF4-FFF2-40B4-BE49-F238E27FC236}">
+                <a16:creationId xmlns:a16="http://schemas.microsoft.com/office/drawing/2014/main" id="{841DBCCE-F307-792F-B301-D54E7E530589}"/>
+              </a:ext>
+            </a:extLst>
+          </p:cNvPr>
+          <p:cNvSpPr txBox="1"/>
+          <p:nvPr/>
+        </p:nvSpPr>
+        <p:spPr>
+          <a:xfrm>
+            <a:off x="5086042" y="5842517"/>
+            <a:ext cx="1516634" cy="369332"/>
+          </a:xfrm>
+          <a:prstGeom prst="rect">
+            <a:avLst/>
+          </a:prstGeom>
+          <a:noFill/>
+        </p:spPr>
+        <p:txBody>
+          <a:bodyPr wrap="none" rtlCol="0">
+            <a:spAutoFit/>
+          </a:bodyPr>
+          <a:lstStyle/>
+          <a:p>
+            <a:r>
+              <a:rPr lang="en-US" altLang="zh-CN" b="1" dirty="0">
+                <a:latin typeface="Hei"/>
+              </a:rPr>
+              <a:t>System Group</a:t>
+            </a:r>
+            <a:endParaRPr lang="zh-CN" altLang="en-US" b="1" dirty="0">
+              <a:latin typeface="Hei"/>
+            </a:endParaRPr>
+          </a:p>
+        </p:txBody>
+      </p:sp>
+      <p:sp>
+        <p:nvSpPr>
+          <p:cNvPr id="49" name="文本框 48">
+            <a:extLst>
+              <a:ext uri="{FF2B5EF4-FFF2-40B4-BE49-F238E27FC236}">
+                <a16:creationId xmlns:a16="http://schemas.microsoft.com/office/drawing/2014/main" id="{2787172E-9815-8C0E-FBF6-646E410B54E6}"/>
+              </a:ext>
+            </a:extLst>
+          </p:cNvPr>
+          <p:cNvSpPr txBox="1"/>
+          <p:nvPr/>
+        </p:nvSpPr>
+        <p:spPr>
+          <a:xfrm>
+            <a:off x="5086042" y="5311982"/>
+            <a:ext cx="1476558" cy="369332"/>
+          </a:xfrm>
+          <a:prstGeom prst="rect">
+            <a:avLst/>
+          </a:prstGeom>
+          <a:noFill/>
+        </p:spPr>
+        <p:txBody>
+          <a:bodyPr wrap="none" rtlCol="0">
+            <a:spAutoFit/>
+          </a:bodyPr>
+          <a:lstStyle/>
+          <a:p>
+            <a:r>
+              <a:rPr lang="en-US" altLang="zh-CN" b="1" dirty="0">
+                <a:latin typeface="Hei"/>
+              </a:rPr>
+              <a:t>Clients Group</a:t>
+            </a:r>
+            <a:endParaRPr lang="zh-CN" altLang="en-US" b="1" dirty="0">
+              <a:latin typeface="Hei"/>
+            </a:endParaRPr>
+          </a:p>
+        </p:txBody>
+      </p:sp>
+      <p:sp>
+        <p:nvSpPr>
+          <p:cNvPr id="50" name="文本框 49">
+            <a:extLst>
+              <a:ext uri="{FF2B5EF4-FFF2-40B4-BE49-F238E27FC236}">
+                <a16:creationId xmlns:a16="http://schemas.microsoft.com/office/drawing/2014/main" id="{3C5EE663-BF08-F9F9-CCE3-88FC97C4B442}"/>
+              </a:ext>
+            </a:extLst>
+          </p:cNvPr>
+          <p:cNvSpPr txBox="1"/>
+          <p:nvPr/>
+        </p:nvSpPr>
+        <p:spPr>
+          <a:xfrm>
+            <a:off x="5112697" y="801473"/>
+            <a:ext cx="1535100" cy="369332"/>
+          </a:xfrm>
+          <a:prstGeom prst="rect">
+            <a:avLst/>
+          </a:prstGeom>
+          <a:noFill/>
+        </p:spPr>
+        <p:txBody>
+          <a:bodyPr wrap="none" rtlCol="0">
+            <a:spAutoFit/>
+          </a:bodyPr>
+          <a:lstStyle/>
+          <a:p>
+            <a:r>
+              <a:rPr lang="en-US" altLang="zh-CN" b="1" dirty="0">
+                <a:latin typeface="Hei"/>
+              </a:rPr>
+              <a:t>Servers Group</a:t>
+            </a:r>
+            <a:endParaRPr lang="zh-CN" altLang="en-US" b="1" dirty="0">
+              <a:latin typeface="Hei"/>
+            </a:endParaRPr>
+          </a:p>
+        </p:txBody>
+      </p:sp>
+      <p:sp>
+        <p:nvSpPr>
+          <p:cNvPr id="51" name="文本框 50">
+            <a:extLst>
+              <a:ext uri="{FF2B5EF4-FFF2-40B4-BE49-F238E27FC236}">
+                <a16:creationId xmlns:a16="http://schemas.microsoft.com/office/drawing/2014/main" id="{797BB794-9EDC-C83D-3084-ECF0DD6F5839}"/>
+              </a:ext>
+            </a:extLst>
+          </p:cNvPr>
+          <p:cNvSpPr txBox="1"/>
+          <p:nvPr/>
+        </p:nvSpPr>
+        <p:spPr>
+          <a:xfrm>
+            <a:off x="9423092" y="1296435"/>
+            <a:ext cx="1979003" cy="369332"/>
+          </a:xfrm>
+          <a:prstGeom prst="rect">
+            <a:avLst/>
+          </a:prstGeom>
+          <a:noFill/>
+        </p:spPr>
+        <p:txBody>
+          <a:bodyPr wrap="none" rtlCol="0">
+            <a:spAutoFit/>
+          </a:bodyPr>
+          <a:lstStyle/>
+          <a:p>
+            <a:r>
+              <a:rPr lang="en-US" altLang="zh-CN" b="1" dirty="0">
+                <a:latin typeface="Hei"/>
+              </a:rPr>
+              <a:t>System Entry Point</a:t>
+            </a:r>
+            <a:endParaRPr lang="zh-CN" altLang="en-US" b="1" dirty="0">
+              <a:latin typeface="Hei"/>
+            </a:endParaRPr>
+          </a:p>
+        </p:txBody>
+      </p:sp>
+      <p:sp>
+        <p:nvSpPr>
+          <p:cNvPr id="52" name="文本框 51">
+            <a:extLst>
+              <a:ext uri="{FF2B5EF4-FFF2-40B4-BE49-F238E27FC236}">
+                <a16:creationId xmlns:a16="http://schemas.microsoft.com/office/drawing/2014/main" id="{68367136-5EC2-5AC1-379D-DAE44B0E907E}"/>
+              </a:ext>
+            </a:extLst>
+          </p:cNvPr>
+          <p:cNvSpPr txBox="1"/>
+          <p:nvPr/>
+        </p:nvSpPr>
+        <p:spPr>
+          <a:xfrm>
+            <a:off x="2971923" y="4496036"/>
+            <a:ext cx="825547" cy="338554"/>
+          </a:xfrm>
+          <a:prstGeom prst="rect">
+            <a:avLst/>
+          </a:prstGeom>
+          <a:noFill/>
+        </p:spPr>
+        <p:txBody>
+          <a:bodyPr wrap="none" rtlCol="0">
+            <a:spAutoFit/>
+          </a:bodyPr>
+          <a:lstStyle/>
+          <a:p>
+            <a:r>
+              <a:rPr lang="en-US" altLang="zh-CN" sz="1600" b="1" dirty="0">
+                <a:solidFill>
+                  <a:schemeClr val="bg1"/>
+                </a:solidFill>
+                <a:latin typeface="Hei"/>
+              </a:rPr>
+              <a:t>Client 1</a:t>
+            </a:r>
+            <a:endParaRPr lang="zh-CN" altLang="en-US" sz="1600" b="1" dirty="0">
+              <a:solidFill>
+                <a:schemeClr val="bg1"/>
+              </a:solidFill>
+              <a:latin typeface="Hei"/>
+            </a:endParaRPr>
+          </a:p>
+        </p:txBody>
+      </p:sp>
+      <p:sp>
+        <p:nvSpPr>
+          <p:cNvPr id="53" name="文本框 52">
+            <a:extLst>
+              <a:ext uri="{FF2B5EF4-FFF2-40B4-BE49-F238E27FC236}">
+                <a16:creationId xmlns:a16="http://schemas.microsoft.com/office/drawing/2014/main" id="{6BADB5D4-CFB2-B540-E71B-3C2A3A769A60}"/>
+              </a:ext>
+            </a:extLst>
+          </p:cNvPr>
+          <p:cNvSpPr txBox="1"/>
+          <p:nvPr/>
+        </p:nvSpPr>
+        <p:spPr>
+          <a:xfrm>
+            <a:off x="3929906" y="4496036"/>
+            <a:ext cx="825547" cy="338554"/>
+          </a:xfrm>
+          <a:prstGeom prst="rect">
+            <a:avLst/>
+          </a:prstGeom>
+          <a:noFill/>
+        </p:spPr>
+        <p:txBody>
+          <a:bodyPr wrap="none" rtlCol="0">
+            <a:spAutoFit/>
+          </a:bodyPr>
+          <a:lstStyle/>
+          <a:p>
+            <a:r>
+              <a:rPr lang="en-US" altLang="zh-CN" sz="1600" b="1" dirty="0">
+                <a:solidFill>
+                  <a:schemeClr val="bg1"/>
+                </a:solidFill>
+                <a:latin typeface="Hei"/>
+              </a:rPr>
+              <a:t>Client 2</a:t>
+            </a:r>
+            <a:endParaRPr lang="zh-CN" altLang="en-US" sz="1600" b="1" dirty="0">
+              <a:solidFill>
+                <a:schemeClr val="bg1"/>
+              </a:solidFill>
+              <a:latin typeface="Hei"/>
+            </a:endParaRPr>
+          </a:p>
+        </p:txBody>
+      </p:sp>
+      <p:sp>
+        <p:nvSpPr>
+          <p:cNvPr id="54" name="文本框 53">
+            <a:extLst>
+              <a:ext uri="{FF2B5EF4-FFF2-40B4-BE49-F238E27FC236}">
+                <a16:creationId xmlns:a16="http://schemas.microsoft.com/office/drawing/2014/main" id="{812CA45B-94EB-F7E6-78C4-81B7BF9DBB56}"/>
+              </a:ext>
+            </a:extLst>
+          </p:cNvPr>
+          <p:cNvSpPr txBox="1"/>
+          <p:nvPr/>
+        </p:nvSpPr>
+        <p:spPr>
+          <a:xfrm>
+            <a:off x="4885781" y="4496036"/>
+            <a:ext cx="825547" cy="338554"/>
+          </a:xfrm>
+          <a:prstGeom prst="rect">
+            <a:avLst/>
+          </a:prstGeom>
+          <a:noFill/>
+        </p:spPr>
+        <p:txBody>
+          <a:bodyPr wrap="none" rtlCol="0">
+            <a:spAutoFit/>
+          </a:bodyPr>
+          <a:lstStyle/>
+          <a:p>
+            <a:r>
+              <a:rPr lang="en-US" altLang="zh-CN" sz="1600" b="1" dirty="0">
+                <a:solidFill>
+                  <a:schemeClr val="bg1"/>
+                </a:solidFill>
+                <a:latin typeface="Hei"/>
+              </a:rPr>
+              <a:t>Client 3</a:t>
+            </a:r>
+            <a:endParaRPr lang="zh-CN" altLang="en-US" sz="1600" b="1" dirty="0">
+              <a:solidFill>
+                <a:schemeClr val="bg1"/>
+              </a:solidFill>
+              <a:latin typeface="Hei"/>
+            </a:endParaRPr>
+          </a:p>
+        </p:txBody>
+      </p:sp>
+      <p:sp>
+        <p:nvSpPr>
+          <p:cNvPr id="55" name="文本框 54">
+            <a:extLst>
+              <a:ext uri="{FF2B5EF4-FFF2-40B4-BE49-F238E27FC236}">
+                <a16:creationId xmlns:a16="http://schemas.microsoft.com/office/drawing/2014/main" id="{89BB1277-ABB2-FF89-6CB8-40EEEE73D267}"/>
+              </a:ext>
+            </a:extLst>
+          </p:cNvPr>
+          <p:cNvSpPr txBox="1"/>
+          <p:nvPr/>
+        </p:nvSpPr>
+        <p:spPr>
+          <a:xfrm>
+            <a:off x="5841656" y="4489227"/>
+            <a:ext cx="825547" cy="338554"/>
+          </a:xfrm>
+          <a:prstGeom prst="rect">
+            <a:avLst/>
+          </a:prstGeom>
+          <a:noFill/>
+        </p:spPr>
+        <p:txBody>
+          <a:bodyPr wrap="none" rtlCol="0">
+            <a:spAutoFit/>
+          </a:bodyPr>
+          <a:lstStyle/>
+          <a:p>
+            <a:r>
+              <a:rPr lang="en-US" altLang="zh-CN" sz="1600" b="1" dirty="0">
+                <a:solidFill>
+                  <a:schemeClr val="bg1"/>
+                </a:solidFill>
+                <a:latin typeface="Hei"/>
+              </a:rPr>
+              <a:t>Client 4</a:t>
+            </a:r>
+            <a:endParaRPr lang="zh-CN" altLang="en-US" sz="1600" b="1" dirty="0">
+              <a:solidFill>
+                <a:schemeClr val="bg1"/>
+              </a:solidFill>
+              <a:latin typeface="Hei"/>
+            </a:endParaRPr>
+          </a:p>
+        </p:txBody>
+      </p:sp>
+      <p:sp>
+        <p:nvSpPr>
+          <p:cNvPr id="56" name="文本框 55">
+            <a:extLst>
+              <a:ext uri="{FF2B5EF4-FFF2-40B4-BE49-F238E27FC236}">
+                <a16:creationId xmlns:a16="http://schemas.microsoft.com/office/drawing/2014/main" id="{611302C9-9973-6010-BC38-85E155F11A21}"/>
+              </a:ext>
+            </a:extLst>
+          </p:cNvPr>
+          <p:cNvSpPr txBox="1"/>
+          <p:nvPr/>
+        </p:nvSpPr>
+        <p:spPr>
+          <a:xfrm>
+            <a:off x="7789555" y="4489227"/>
+            <a:ext cx="856004" cy="338554"/>
+          </a:xfrm>
+          <a:prstGeom prst="rect">
+            <a:avLst/>
+          </a:prstGeom>
+          <a:noFill/>
+        </p:spPr>
+        <p:txBody>
+          <a:bodyPr wrap="none" rtlCol="0">
+            <a:spAutoFit/>
+          </a:bodyPr>
+          <a:lstStyle/>
+          <a:p>
+            <a:r>
+              <a:rPr lang="en-US" altLang="zh-CN" sz="1600" b="1" dirty="0">
+                <a:solidFill>
+                  <a:schemeClr val="bg1"/>
+                </a:solidFill>
+                <a:latin typeface="Hei"/>
+              </a:rPr>
+              <a:t>Client N</a:t>
+            </a:r>
+            <a:endParaRPr lang="zh-CN" altLang="en-US" sz="1600" b="1" dirty="0">
+              <a:solidFill>
+                <a:schemeClr val="bg1"/>
+              </a:solidFill>
+              <a:latin typeface="Hei"/>
+            </a:endParaRPr>
+          </a:p>
+        </p:txBody>
+      </p:sp>
+      <p:sp>
+        <p:nvSpPr>
+          <p:cNvPr id="57" name="文本框 56">
+            <a:extLst>
+              <a:ext uri="{FF2B5EF4-FFF2-40B4-BE49-F238E27FC236}">
+                <a16:creationId xmlns:a16="http://schemas.microsoft.com/office/drawing/2014/main" id="{97C99EAD-42E8-F2F0-200A-DB77F9473377}"/>
+              </a:ext>
+            </a:extLst>
+          </p:cNvPr>
+          <p:cNvSpPr txBox="1"/>
+          <p:nvPr/>
+        </p:nvSpPr>
+        <p:spPr>
+          <a:xfrm>
+            <a:off x="7008340" y="4496036"/>
+            <a:ext cx="330540" cy="338554"/>
+          </a:xfrm>
+          <a:prstGeom prst="rect">
+            <a:avLst/>
+          </a:prstGeom>
+          <a:noFill/>
+        </p:spPr>
+        <p:txBody>
+          <a:bodyPr wrap="none" rtlCol="0">
+            <a:spAutoFit/>
+          </a:bodyPr>
+          <a:lstStyle/>
+          <a:p>
+            <a:r>
+              <a:rPr lang="en-US" altLang="zh-CN" sz="1600" b="1" dirty="0">
+                <a:solidFill>
+                  <a:schemeClr val="bg1"/>
+                </a:solidFill>
+                <a:latin typeface="Hei"/>
+              </a:rPr>
+              <a:t>…</a:t>
+            </a:r>
+            <a:endParaRPr lang="zh-CN" altLang="en-US" sz="1600" b="1" dirty="0">
+              <a:solidFill>
+                <a:schemeClr val="bg1"/>
+              </a:solidFill>
+              <a:latin typeface="Hei"/>
+            </a:endParaRPr>
+          </a:p>
+        </p:txBody>
+      </p:sp>
+      <p:sp>
+        <p:nvSpPr>
+          <p:cNvPr id="58" name="文本框 57">
+            <a:extLst>
+              <a:ext uri="{FF2B5EF4-FFF2-40B4-BE49-F238E27FC236}">
+                <a16:creationId xmlns:a16="http://schemas.microsoft.com/office/drawing/2014/main" id="{61996663-0D47-0B00-AA3A-1324AE5EA5AE}"/>
+              </a:ext>
+            </a:extLst>
+          </p:cNvPr>
+          <p:cNvSpPr txBox="1"/>
+          <p:nvPr/>
+        </p:nvSpPr>
+        <p:spPr>
+          <a:xfrm>
+            <a:off x="7267709" y="1117688"/>
+            <a:ext cx="883447" cy="338554"/>
+          </a:xfrm>
+          <a:prstGeom prst="rect">
+            <a:avLst/>
+          </a:prstGeom>
+          <a:noFill/>
+        </p:spPr>
+        <p:txBody>
+          <a:bodyPr wrap="none" rtlCol="0">
+            <a:spAutoFit/>
+          </a:bodyPr>
+          <a:lstStyle/>
+          <a:p>
+            <a:r>
+              <a:rPr lang="en-US" altLang="zh-CN" sz="1600" b="1" dirty="0">
+                <a:solidFill>
+                  <a:schemeClr val="bg1"/>
+                </a:solidFill>
+                <a:latin typeface="Hei"/>
+              </a:rPr>
+              <a:t>Server 1</a:t>
+            </a:r>
+            <a:endParaRPr lang="zh-CN" altLang="en-US" sz="1600" b="1" dirty="0">
+              <a:solidFill>
+                <a:schemeClr val="bg1"/>
+              </a:solidFill>
+              <a:latin typeface="Hei"/>
+            </a:endParaRPr>
+          </a:p>
+        </p:txBody>
+      </p:sp>
+      <p:sp>
+        <p:nvSpPr>
+          <p:cNvPr id="60" name="文本框 59">
+            <a:extLst>
+              <a:ext uri="{FF2B5EF4-FFF2-40B4-BE49-F238E27FC236}">
+                <a16:creationId xmlns:a16="http://schemas.microsoft.com/office/drawing/2014/main" id="{6E49A293-C8DE-87A2-C997-3AA488039817}"/>
+              </a:ext>
+            </a:extLst>
+          </p:cNvPr>
+          <p:cNvSpPr txBox="1"/>
+          <p:nvPr/>
+        </p:nvSpPr>
+        <p:spPr>
+          <a:xfrm>
+            <a:off x="3526087" y="1117688"/>
+            <a:ext cx="913905" cy="338554"/>
+          </a:xfrm>
+          <a:prstGeom prst="rect">
+            <a:avLst/>
+          </a:prstGeom>
+          <a:noFill/>
+        </p:spPr>
+        <p:txBody>
+          <a:bodyPr wrap="none" rtlCol="0">
+            <a:spAutoFit/>
+          </a:bodyPr>
+          <a:lstStyle/>
+          <a:p>
+            <a:r>
+              <a:rPr lang="en-US" altLang="zh-CN" sz="1600" b="1" dirty="0">
+                <a:solidFill>
+                  <a:schemeClr val="bg1"/>
+                </a:solidFill>
+                <a:latin typeface="Hei"/>
+              </a:rPr>
+              <a:t>Server N</a:t>
+            </a:r>
+            <a:endParaRPr lang="zh-CN" altLang="en-US" sz="1600" b="1" dirty="0">
+              <a:solidFill>
+                <a:schemeClr val="bg1"/>
+              </a:solidFill>
+              <a:latin typeface="Hei"/>
+            </a:endParaRPr>
+          </a:p>
+        </p:txBody>
+      </p:sp>
+      <p:sp>
+        <p:nvSpPr>
+          <p:cNvPr id="9" name="矩形: 圆角 8">
+            <a:extLst>
+              <a:ext uri="{FF2B5EF4-FFF2-40B4-BE49-F238E27FC236}">
+                <a16:creationId xmlns:a16="http://schemas.microsoft.com/office/drawing/2014/main" id="{265AEA2B-47C3-A366-FBE0-0B5F37F5D04F}"/>
+              </a:ext>
+            </a:extLst>
+          </p:cNvPr>
+          <p:cNvSpPr/>
+          <p:nvPr/>
+        </p:nvSpPr>
+        <p:spPr>
+          <a:xfrm>
+            <a:off x="5139066" y="2271825"/>
+            <a:ext cx="1410587" cy="1346790"/>
+          </a:xfrm>
+          <a:prstGeom prst="roundRect">
+            <a:avLst/>
+          </a:prstGeom>
+          <a:solidFill>
+            <a:schemeClr val="accent1">
+              <a:lumMod val="75000"/>
+            </a:schemeClr>
+          </a:solidFill>
+          <a:ln>
+            <a:noFill/>
+          </a:ln>
+        </p:spPr>
+        <p:style>
+          <a:lnRef idx="2">
+            <a:schemeClr val="accent1">
+              <a:shade val="50000"/>
+            </a:schemeClr>
+          </a:lnRef>
+          <a:fillRef idx="1">
+            <a:schemeClr val="accent1"/>
+          </a:fillRef>
+          <a:effectRef idx="0">
+            <a:schemeClr val="accent1"/>
+          </a:effectRef>
+          <a:fontRef idx="minor">
+            <a:schemeClr val="lt1"/>
+          </a:fontRef>
+        </p:style>
+        <p:txBody>
+          <a:bodyPr rtlCol="0" anchor="ctr"/>
+          <a:lstStyle/>
+          <a:p>
+            <a:pPr algn="ctr"/>
+            <a:endParaRPr lang="zh-CN" altLang="en-US"/>
+          </a:p>
+        </p:txBody>
+      </p:sp>
+      <p:sp>
+        <p:nvSpPr>
+          <p:cNvPr id="59" name="文本框 58">
+            <a:extLst>
+              <a:ext uri="{FF2B5EF4-FFF2-40B4-BE49-F238E27FC236}">
+                <a16:creationId xmlns:a16="http://schemas.microsoft.com/office/drawing/2014/main" id="{756D98A7-6D8B-C110-2A01-28B9CAC9C9A9}"/>
+              </a:ext>
+            </a:extLst>
+          </p:cNvPr>
+          <p:cNvSpPr txBox="1"/>
+          <p:nvPr/>
+        </p:nvSpPr>
+        <p:spPr>
+          <a:xfrm>
+            <a:off x="5218198" y="2360445"/>
+            <a:ext cx="1266501" cy="584775"/>
+          </a:xfrm>
+          <a:prstGeom prst="rect">
+            <a:avLst/>
+          </a:prstGeom>
+          <a:noFill/>
+        </p:spPr>
+        <p:txBody>
+          <a:bodyPr wrap="none" rtlCol="0">
+            <a:spAutoFit/>
+          </a:bodyPr>
+          <a:lstStyle/>
+          <a:p>
+            <a:r>
+              <a:rPr lang="en-US" altLang="zh-CN" sz="1600" b="1" dirty="0">
+                <a:solidFill>
+                  <a:schemeClr val="bg1"/>
+                </a:solidFill>
+                <a:latin typeface="Hei"/>
+              </a:rPr>
+              <a:t>Proxy (main)</a:t>
+            </a:r>
+          </a:p>
+          <a:p>
+            <a:r>
+              <a:rPr lang="en-US" altLang="zh-CN" sz="1600" b="1" dirty="0">
+                <a:solidFill>
+                  <a:schemeClr val="bg1"/>
+                </a:solidFill>
+                <a:latin typeface="Hei"/>
+              </a:rPr>
+              <a:t>Server</a:t>
+            </a:r>
+            <a:endParaRPr lang="zh-CN" altLang="en-US" sz="1600" b="1" dirty="0">
+              <a:solidFill>
+                <a:schemeClr val="bg1"/>
+              </a:solidFill>
+              <a:latin typeface="Hei"/>
+            </a:endParaRPr>
+          </a:p>
+        </p:txBody>
+      </p:sp>
+      <p:sp>
+        <p:nvSpPr>
+          <p:cNvPr id="67" name="星形: 五角 66">
+            <a:extLst>
+              <a:ext uri="{FF2B5EF4-FFF2-40B4-BE49-F238E27FC236}">
+                <a16:creationId xmlns:a16="http://schemas.microsoft.com/office/drawing/2014/main" id="{9F9EEB65-3968-8C90-5519-B2CF31185FBF}"/>
+              </a:ext>
+            </a:extLst>
+          </p:cNvPr>
+          <p:cNvSpPr/>
+          <p:nvPr/>
+        </p:nvSpPr>
+        <p:spPr>
+          <a:xfrm>
+            <a:off x="6240497" y="2005235"/>
+            <a:ext cx="412754" cy="459523"/>
+          </a:xfrm>
+          <a:prstGeom prst="star5">
+            <a:avLst/>
+          </a:prstGeom>
+        </p:spPr>
+        <p:style>
+          <a:lnRef idx="2">
+            <a:schemeClr val="accent4">
+              <a:shade val="50000"/>
+            </a:schemeClr>
+          </a:lnRef>
+          <a:fillRef idx="1">
+            <a:schemeClr val="accent4"/>
+          </a:fillRef>
+          <a:effectRef idx="0">
+            <a:schemeClr val="accent4"/>
+          </a:effectRef>
+          <a:fontRef idx="minor">
+            <a:schemeClr val="lt1"/>
+          </a:fontRef>
+        </p:style>
+        <p:txBody>
+          <a:bodyPr rtlCol="0" anchor="ctr"/>
+          <a:lstStyle/>
+          <a:p>
+            <a:pPr algn="ctr"/>
+            <a:endParaRPr lang="zh-CN" altLang="en-US"/>
+          </a:p>
+        </p:txBody>
+      </p:sp>
+    </p:spTree>
+    <p:extLst>
+      <p:ext uri="{BB962C8B-B14F-4D97-AF65-F5344CB8AC3E}">
+        <p14:creationId xmlns:p14="http://schemas.microsoft.com/office/powerpoint/2010/main" val="4030988893"/>
+      </p:ext>
+    </p:extLst>
+  </p:cSld>
+  <p:clrMapOvr>
+    <a:masterClrMapping/>
+  </p:clrMapOvr>
+</p:sld>
+</file>
+
 <file path=ppt/theme/theme1.xml><?xml version="1.0" encoding="utf-8"?>
 <a:theme xmlns:a="http://schemas.openxmlformats.org/drawingml/2006/main" name="Office 主题​​">
   <a:themeElements>

</xml_diff>